<commit_message>
Updates to the Powerpoint
</commit_message>
<xml_diff>
--- a/Files/Metadata_Groupings/Tables.pptx
+++ b/Files/Metadata_Groupings/Tables.pptx
@@ -327,6 +327,11 @@
       </a:defRPr>
     </a:lvl9pPr>
   </p:defaultTextStyle>
+  <p:extLst>
+    <p:ext uri="{EFAFB233-063F-42B5-8137-9DF3F51BA10A}">
+      <p15:sldGuideLst xmlns:p15="http://schemas.microsoft.com/office/powerpoint/2012/main"/>
+    </p:ext>
+  </p:extLst>
 </p:presentation>
 </file>
 
@@ -2158,7 +2163,7 @@
           </a:ln>
           <a:extLst>
             <a:ext uri="{C572A759-6A51-4108-AA02-DFA0A04FC94B}">
-              <ma14:wrappingTextBoxFlag xmlns:ma14="http://schemas.microsoft.com/office/mac/drawingml/2011/main" xmlns="" val="1"/>
+              <ma14:wrappingTextBoxFlag xmlns="" xmlns:ma14="http://schemas.microsoft.com/office/mac/drawingml/2011/main" val="1"/>
             </a:ext>
           </a:extLst>
         </p:spPr>
@@ -2197,7 +2202,7 @@
           </a:ln>
           <a:extLst>
             <a:ext uri="{C572A759-6A51-4108-AA02-DFA0A04FC94B}">
-              <ma14:wrappingTextBoxFlag xmlns:ma14="http://schemas.microsoft.com/office/mac/drawingml/2011/main" xmlns="" val="1"/>
+              <ma14:wrappingTextBoxFlag xmlns="" xmlns:ma14="http://schemas.microsoft.com/office/mac/drawingml/2011/main" val="1"/>
             </a:ext>
           </a:extLst>
         </p:spPr>
@@ -3273,7 +3278,7 @@
           </a:ln>
           <a:extLst>
             <a:ext uri="{C572A759-6A51-4108-AA02-DFA0A04FC94B}">
-              <ma14:wrappingTextBoxFlag xmlns:ma14="http://schemas.microsoft.com/office/mac/drawingml/2011/main" xmlns="" val="1"/>
+              <ma14:wrappingTextBoxFlag xmlns="" xmlns:ma14="http://schemas.microsoft.com/office/mac/drawingml/2011/main" val="1"/>
             </a:ext>
           </a:extLst>
         </p:spPr>
@@ -3577,7 +3582,7 @@
             <a:effectLst/>
             <a:extLst>
               <a:ext uri="{C572A759-6A51-4108-AA02-DFA0A04FC94B}">
-                <ma14:wrappingTextBoxFlag xmlns:ma14="http://schemas.microsoft.com/office/mac/drawingml/2011/main" xmlns="" val="1"/>
+                <ma14:wrappingTextBoxFlag xmlns="" xmlns:ma14="http://schemas.microsoft.com/office/mac/drawingml/2011/main" val="1"/>
               </a:ext>
             </a:extLst>
           </p:spPr>
@@ -3706,7 +3711,7 @@
             <a:effectLst/>
             <a:extLst>
               <a:ext uri="{C572A759-6A51-4108-AA02-DFA0A04FC94B}">
-                <ma14:wrappingTextBoxFlag xmlns:ma14="http://schemas.microsoft.com/office/mac/drawingml/2011/main" xmlns="" val="1"/>
+                <ma14:wrappingTextBoxFlag xmlns="" xmlns:ma14="http://schemas.microsoft.com/office/mac/drawingml/2011/main" val="1"/>
               </a:ext>
             </a:extLst>
           </p:spPr>
@@ -3821,7 +3826,7 @@
             <a:effectLst/>
             <a:extLst>
               <a:ext uri="{C572A759-6A51-4108-AA02-DFA0A04FC94B}">
-                <ma14:wrappingTextBoxFlag xmlns:ma14="http://schemas.microsoft.com/office/mac/drawingml/2011/main" xmlns="" val="1"/>
+                <ma14:wrappingTextBoxFlag xmlns="" xmlns:ma14="http://schemas.microsoft.com/office/mac/drawingml/2011/main" val="1"/>
               </a:ext>
             </a:extLst>
           </p:spPr>
@@ -4018,7 +4023,7 @@
             <a:effectLst/>
             <a:extLst>
               <a:ext uri="{C572A759-6A51-4108-AA02-DFA0A04FC94B}">
-                <ma14:wrappingTextBoxFlag xmlns:ma14="http://schemas.microsoft.com/office/mac/drawingml/2011/main" xmlns="" val="1"/>
+                <ma14:wrappingTextBoxFlag xmlns="" xmlns:ma14="http://schemas.microsoft.com/office/mac/drawingml/2011/main" val="1"/>
               </a:ext>
             </a:extLst>
           </p:spPr>
@@ -4572,7 +4577,7 @@
               <a:effectLst/>
               <a:extLst>
                 <a:ext uri="{C572A759-6A51-4108-AA02-DFA0A04FC94B}">
-                  <ma14:wrappingTextBoxFlag xmlns:ma14="http://schemas.microsoft.com/office/mac/drawingml/2011/main" xmlns="" val="1"/>
+                  <ma14:wrappingTextBoxFlag xmlns="" xmlns:ma14="http://schemas.microsoft.com/office/mac/drawingml/2011/main" val="1"/>
                 </a:ext>
               </a:extLst>
             </p:spPr>
@@ -4583,8 +4588,10 @@
               <a:lstStyle/>
               <a:p>
                 <a:r>
-                  <a:t>Metadata</a:t>
+                  <a:rPr lang="en-US" dirty="0"/>
+                  <a:t>Keywords</a:t>
                 </a:r>
+                <a:endParaRPr dirty="0"/>
               </a:p>
             </p:txBody>
           </p:sp>
@@ -4716,7 +4723,7 @@
               <a:effectLst/>
               <a:extLst>
                 <a:ext uri="{C572A759-6A51-4108-AA02-DFA0A04FC94B}">
-                  <ma14:wrappingTextBoxFlag xmlns:ma14="http://schemas.microsoft.com/office/mac/drawingml/2011/main" xmlns="" val="1"/>
+                  <ma14:wrappingTextBoxFlag xmlns="" xmlns:ma14="http://schemas.microsoft.com/office/mac/drawingml/2011/main" val="1"/>
                 </a:ext>
               </a:extLst>
             </p:spPr>
@@ -4987,7 +4994,7 @@
               <a:effectLst/>
               <a:extLst>
                 <a:ext uri="{C572A759-6A51-4108-AA02-DFA0A04FC94B}">
-                  <ma14:wrappingTextBoxFlag xmlns:ma14="http://schemas.microsoft.com/office/mac/drawingml/2011/main" xmlns="" val="1"/>
+                  <ma14:wrappingTextBoxFlag xmlns="" xmlns:ma14="http://schemas.microsoft.com/office/mac/drawingml/2011/main" val="1"/>
                 </a:ext>
               </a:extLst>
             </p:spPr>
@@ -5130,7 +5137,7 @@
               <a:effectLst/>
               <a:extLst>
                 <a:ext uri="{C572A759-6A51-4108-AA02-DFA0A04FC94B}">
-                  <ma14:wrappingTextBoxFlag xmlns:ma14="http://schemas.microsoft.com/office/mac/drawingml/2011/main" xmlns="" val="1"/>
+                  <ma14:wrappingTextBoxFlag xmlns="" xmlns:ma14="http://schemas.microsoft.com/office/mac/drawingml/2011/main" val="1"/>
                 </a:ext>
               </a:extLst>
             </p:spPr>
@@ -5235,7 +5242,7 @@
               <a:effectLst/>
               <a:extLst>
                 <a:ext uri="{C572A759-6A51-4108-AA02-DFA0A04FC94B}">
-                  <ma14:wrappingTextBoxFlag xmlns:ma14="http://schemas.microsoft.com/office/mac/drawingml/2011/main" xmlns="" val="1"/>
+                  <ma14:wrappingTextBoxFlag xmlns="" xmlns:ma14="http://schemas.microsoft.com/office/mac/drawingml/2011/main" val="1"/>
                 </a:ext>
               </a:extLst>
             </p:spPr>
@@ -5340,7 +5347,7 @@
               <a:effectLst/>
               <a:extLst>
                 <a:ext uri="{C572A759-6A51-4108-AA02-DFA0A04FC94B}">
-                  <ma14:wrappingTextBoxFlag xmlns:ma14="http://schemas.microsoft.com/office/mac/drawingml/2011/main" xmlns="" val="1"/>
+                  <ma14:wrappingTextBoxFlag xmlns="" xmlns:ma14="http://schemas.microsoft.com/office/mac/drawingml/2011/main" val="1"/>
                 </a:ext>
               </a:extLst>
             </p:spPr>
@@ -5451,7 +5458,7 @@
               <a:effectLst/>
               <a:extLst>
                 <a:ext uri="{C572A759-6A51-4108-AA02-DFA0A04FC94B}">
-                  <ma14:wrappingTextBoxFlag xmlns:ma14="http://schemas.microsoft.com/office/mac/drawingml/2011/main" xmlns="" val="1"/>
+                  <ma14:wrappingTextBoxFlag xmlns="" xmlns:ma14="http://schemas.microsoft.com/office/mac/drawingml/2011/main" val="1"/>
                 </a:ext>
               </a:extLst>
             </p:spPr>
@@ -5692,7 +5699,7 @@
               <a:effectLst/>
               <a:extLst>
                 <a:ext uri="{C572A759-6A51-4108-AA02-DFA0A04FC94B}">
-                  <ma14:wrappingTextBoxFlag xmlns:ma14="http://schemas.microsoft.com/office/mac/drawingml/2011/main" xmlns="" val="1"/>
+                  <ma14:wrappingTextBoxFlag xmlns="" xmlns:ma14="http://schemas.microsoft.com/office/mac/drawingml/2011/main" val="1"/>
                 </a:ext>
               </a:extLst>
             </p:spPr>
@@ -6214,7 +6221,7 @@
           </a:ln>
           <a:extLst>
             <a:ext uri="{C572A759-6A51-4108-AA02-DFA0A04FC94B}">
-              <ma14:wrappingTextBoxFlag xmlns:ma14="http://schemas.microsoft.com/office/mac/drawingml/2011/main" xmlns="" val="1"/>
+              <ma14:wrappingTextBoxFlag xmlns="" xmlns:ma14="http://schemas.microsoft.com/office/mac/drawingml/2011/main" val="1"/>
             </a:ext>
           </a:extLst>
         </p:spPr>
@@ -6256,7 +6263,7 @@
           </a:ln>
           <a:extLst>
             <a:ext uri="{C572A759-6A51-4108-AA02-DFA0A04FC94B}">
-              <ma14:wrappingTextBoxFlag xmlns:ma14="http://schemas.microsoft.com/office/mac/drawingml/2011/main" xmlns="" val="1"/>
+              <ma14:wrappingTextBoxFlag xmlns="" xmlns:ma14="http://schemas.microsoft.com/office/mac/drawingml/2011/main" val="1"/>
             </a:ext>
           </a:extLst>
         </p:spPr>
@@ -6500,7 +6507,9 @@
           </a:prstGeom>
         </p:spPr>
         <p:txBody>
-          <a:bodyPr/>
+          <a:bodyPr>
+            <a:normAutofit lnSpcReduction="10000"/>
+          </a:bodyPr>
           <a:lstStyle/>
           <a:p>
             <a:pPr marL="0" indent="0" defTabSz="543305">
@@ -6571,7 +6580,15 @@
             </a:pPr>
             <a:r>
               <a:rPr dirty="0"/>
-              <a:t>Images are taken from Customer Profile which currently DOES NOT include etching assets.  So etching images will appear not found</a:t>
+              <a:t>Images are taken from </a:t>
+            </a:r>
+            <a:r>
+              <a:rPr lang="en-US" dirty="0"/>
+              <a:t>integration </a:t>
+            </a:r>
+            <a:r>
+              <a:rPr dirty="0"/>
+              <a:t>Customer Profile which currently DOES NOT include etching assets.  So etching images will appear not found</a:t>
             </a:r>
           </a:p>
           <a:p>
@@ -7119,7 +7136,7 @@
           </a:ln>
           <a:extLst>
             <a:ext uri="{C572A759-6A51-4108-AA02-DFA0A04FC94B}">
-              <ma14:wrappingTextBoxFlag xmlns:ma14="http://schemas.microsoft.com/office/mac/drawingml/2011/main" xmlns="" val="1"/>
+              <ma14:wrappingTextBoxFlag xmlns="" xmlns:ma14="http://schemas.microsoft.com/office/mac/drawingml/2011/main" val="1"/>
             </a:ext>
           </a:extLst>
         </p:spPr>
@@ -7407,7 +7424,7 @@
             <a:effectLst/>
             <a:extLst>
               <a:ext uri="{C572A759-6A51-4108-AA02-DFA0A04FC94B}">
-                <ma14:wrappingTextBoxFlag xmlns:ma14="http://schemas.microsoft.com/office/mac/drawingml/2011/main" xmlns="" val="1"/>
+                <ma14:wrappingTextBoxFlag xmlns="" xmlns:ma14="http://schemas.microsoft.com/office/mac/drawingml/2011/main" val="1"/>
               </a:ext>
             </a:extLst>
           </p:spPr>
@@ -7509,7 +7526,7 @@
             <a:effectLst/>
             <a:extLst>
               <a:ext uri="{C572A759-6A51-4108-AA02-DFA0A04FC94B}">
-                <ma14:wrappingTextBoxFlag xmlns:ma14="http://schemas.microsoft.com/office/mac/drawingml/2011/main" xmlns="" val="1"/>
+                <ma14:wrappingTextBoxFlag xmlns="" xmlns:ma14="http://schemas.microsoft.com/office/mac/drawingml/2011/main" val="1"/>
               </a:ext>
             </a:extLst>
           </p:spPr>
@@ -7676,7 +7693,7 @@
             <a:effectLst/>
             <a:extLst>
               <a:ext uri="{C572A759-6A51-4108-AA02-DFA0A04FC94B}">
-                <ma14:wrappingTextBoxFlag xmlns:ma14="http://schemas.microsoft.com/office/mac/drawingml/2011/main" xmlns="" val="1"/>
+                <ma14:wrappingTextBoxFlag xmlns="" xmlns:ma14="http://schemas.microsoft.com/office/mac/drawingml/2011/main" val="1"/>
               </a:ext>
             </a:extLst>
           </p:spPr>
@@ -7824,7 +7841,7 @@
             <a:effectLst/>
             <a:extLst>
               <a:ext uri="{C572A759-6A51-4108-AA02-DFA0A04FC94B}">
-                <ma14:wrappingTextBoxFlag xmlns:ma14="http://schemas.microsoft.com/office/mac/drawingml/2011/main" xmlns="" val="1"/>
+                <ma14:wrappingTextBoxFlag xmlns="" xmlns:ma14="http://schemas.microsoft.com/office/mac/drawingml/2011/main" val="1"/>
               </a:ext>
             </a:extLst>
           </p:spPr>
@@ -7995,7 +8012,7 @@
             <a:effectLst/>
             <a:extLst>
               <a:ext uri="{C572A759-6A51-4108-AA02-DFA0A04FC94B}">
-                <ma14:wrappingTextBoxFlag xmlns:ma14="http://schemas.microsoft.com/office/mac/drawingml/2011/main" xmlns="" val="1"/>
+                <ma14:wrappingTextBoxFlag xmlns="" xmlns:ma14="http://schemas.microsoft.com/office/mac/drawingml/2011/main" val="1"/>
               </a:ext>
             </a:extLst>
           </p:spPr>
@@ -8206,7 +8223,7 @@
             <a:effectLst/>
             <a:extLst>
               <a:ext uri="{C572A759-6A51-4108-AA02-DFA0A04FC94B}">
-                <ma14:wrappingTextBoxFlag xmlns:ma14="http://schemas.microsoft.com/office/mac/drawingml/2011/main" xmlns="" val="1"/>
+                <ma14:wrappingTextBoxFlag xmlns="" xmlns:ma14="http://schemas.microsoft.com/office/mac/drawingml/2011/main" val="1"/>
               </a:ext>
             </a:extLst>
           </p:spPr>
@@ -8357,7 +8374,7 @@
             <a:effectLst/>
             <a:extLst>
               <a:ext uri="{C572A759-6A51-4108-AA02-DFA0A04FC94B}">
-                <ma14:wrappingTextBoxFlag xmlns:ma14="http://schemas.microsoft.com/office/mac/drawingml/2011/main" xmlns="" val="1"/>
+                <ma14:wrappingTextBoxFlag xmlns="" xmlns:ma14="http://schemas.microsoft.com/office/mac/drawingml/2011/main" val="1"/>
               </a:ext>
             </a:extLst>
           </p:spPr>
@@ -8474,7 +8491,7 @@
             <a:effectLst/>
             <a:extLst>
               <a:ext uri="{C572A759-6A51-4108-AA02-DFA0A04FC94B}">
-                <ma14:wrappingTextBoxFlag xmlns:ma14="http://schemas.microsoft.com/office/mac/drawingml/2011/main" xmlns="" val="1"/>
+                <ma14:wrappingTextBoxFlag xmlns="" xmlns:ma14="http://schemas.microsoft.com/office/mac/drawingml/2011/main" val="1"/>
               </a:ext>
             </a:extLst>
           </p:spPr>
@@ -8707,7 +8724,7 @@
             <a:effectLst/>
             <a:extLst>
               <a:ext uri="{C572A759-6A51-4108-AA02-DFA0A04FC94B}">
-                <ma14:wrappingTextBoxFlag xmlns:ma14="http://schemas.microsoft.com/office/mac/drawingml/2011/main" xmlns="" val="1"/>
+                <ma14:wrappingTextBoxFlag xmlns="" xmlns:ma14="http://schemas.microsoft.com/office/mac/drawingml/2011/main" val="1"/>
               </a:ext>
             </a:extLst>
           </p:spPr>
@@ -10566,7 +10583,7 @@
           </a:ln>
           <a:extLst>
             <a:ext uri="{C572A759-6A51-4108-AA02-DFA0A04FC94B}">
-              <ma14:wrappingTextBoxFlag xmlns:ma14="http://schemas.microsoft.com/office/mac/drawingml/2011/main" xmlns="" val="1"/>
+              <ma14:wrappingTextBoxFlag xmlns="" xmlns:ma14="http://schemas.microsoft.com/office/mac/drawingml/2011/main" val="1"/>
             </a:ext>
           </a:extLst>
         </p:spPr>
@@ -10918,7 +10935,7 @@
             <a:effectLst/>
             <a:extLst>
               <a:ext uri="{C572A759-6A51-4108-AA02-DFA0A04FC94B}">
-                <ma14:wrappingTextBoxFlag xmlns:ma14="http://schemas.microsoft.com/office/mac/drawingml/2011/main" xmlns="" val="1"/>
+                <ma14:wrappingTextBoxFlag xmlns="" xmlns:ma14="http://schemas.microsoft.com/office/mac/drawingml/2011/main" val="1"/>
               </a:ext>
             </a:extLst>
           </p:spPr>
@@ -11020,7 +11037,7 @@
             <a:effectLst/>
             <a:extLst>
               <a:ext uri="{C572A759-6A51-4108-AA02-DFA0A04FC94B}">
-                <ma14:wrappingTextBoxFlag xmlns:ma14="http://schemas.microsoft.com/office/mac/drawingml/2011/main" xmlns="" val="1"/>
+                <ma14:wrappingTextBoxFlag xmlns="" xmlns:ma14="http://schemas.microsoft.com/office/mac/drawingml/2011/main" val="1"/>
               </a:ext>
             </a:extLst>
           </p:spPr>
@@ -11122,7 +11139,7 @@
             <a:effectLst/>
             <a:extLst>
               <a:ext uri="{C572A759-6A51-4108-AA02-DFA0A04FC94B}">
-                <ma14:wrappingTextBoxFlag xmlns:ma14="http://schemas.microsoft.com/office/mac/drawingml/2011/main" xmlns="" val="1"/>
+                <ma14:wrappingTextBoxFlag xmlns="" xmlns:ma14="http://schemas.microsoft.com/office/mac/drawingml/2011/main" val="1"/>
               </a:ext>
             </a:extLst>
           </p:spPr>
@@ -11304,7 +11321,7 @@
             <a:effectLst/>
             <a:extLst>
               <a:ext uri="{C572A759-6A51-4108-AA02-DFA0A04FC94B}">
-                <ma14:wrappingTextBoxFlag xmlns:ma14="http://schemas.microsoft.com/office/mac/drawingml/2011/main" xmlns="" val="1"/>
+                <ma14:wrappingTextBoxFlag xmlns="" xmlns:ma14="http://schemas.microsoft.com/office/mac/drawingml/2011/main" val="1"/>
               </a:ext>
             </a:extLst>
           </p:spPr>
@@ -11406,7 +11423,7 @@
             <a:effectLst/>
             <a:extLst>
               <a:ext uri="{C572A759-6A51-4108-AA02-DFA0A04FC94B}">
-                <ma14:wrappingTextBoxFlag xmlns:ma14="http://schemas.microsoft.com/office/mac/drawingml/2011/main" xmlns="" val="1"/>
+                <ma14:wrappingTextBoxFlag xmlns="" xmlns:ma14="http://schemas.microsoft.com/office/mac/drawingml/2011/main" val="1"/>
               </a:ext>
             </a:extLst>
           </p:spPr>
@@ -11508,7 +11525,7 @@
             <a:effectLst/>
             <a:extLst>
               <a:ext uri="{C572A759-6A51-4108-AA02-DFA0A04FC94B}">
-                <ma14:wrappingTextBoxFlag xmlns:ma14="http://schemas.microsoft.com/office/mac/drawingml/2011/main" xmlns="" val="1"/>
+                <ma14:wrappingTextBoxFlag xmlns="" xmlns:ma14="http://schemas.microsoft.com/office/mac/drawingml/2011/main" val="1"/>
               </a:ext>
             </a:extLst>
           </p:spPr>
@@ -11548,7 +11565,7 @@
           </a:ln>
           <a:extLst>
             <a:ext uri="{C572A759-6A51-4108-AA02-DFA0A04FC94B}">
-              <ma14:wrappingTextBoxFlag xmlns:ma14="http://schemas.microsoft.com/office/mac/drawingml/2011/main" xmlns="" val="1"/>
+              <ma14:wrappingTextBoxFlag xmlns="" xmlns:ma14="http://schemas.microsoft.com/office/mac/drawingml/2011/main" val="1"/>
             </a:ext>
           </a:extLst>
         </p:spPr>

</xml_diff>